<commit_message>
RAG & Front-End Adjust
</commit_message>
<xml_diff>
--- a/Side Project.pptx
+++ b/Side Project.pptx
@@ -7,7 +7,8 @@
   <p:sldIdLst>
     <p:sldId id="256" r:id="rId2"/>
     <p:sldId id="258" r:id="rId3"/>
-    <p:sldId id="257" r:id="rId4"/>
+    <p:sldId id="259" r:id="rId4"/>
+    <p:sldId id="257" r:id="rId5"/>
   </p:sldIdLst>
   <p:sldSz cx="12192000" cy="6858000"/>
   <p:notesSz cx="6858000" cy="9144000"/>
@@ -106,6 +107,11 @@
       </a:defRPr>
     </a:lvl9pPr>
   </p:defaultTextStyle>
+  <p:extLst>
+    <p:ext uri="{EFAFB233-063F-42B5-8137-9DF3F51BA10A}">
+      <p15:sldGuideLst xmlns:p15="http://schemas.microsoft.com/office/powerpoint/2012/main"/>
+    </p:ext>
+  </p:extLst>
 </p:presentation>
 </file>
 
@@ -151,10 +157,9 @@
           </a:lstStyle>
           <a:p>
             <a:r>
-              <a:rPr lang="zh-TW" altLang="en-US" smtClean="0"/>
+              <a:rPr lang="zh-TW" altLang="en-US"/>
               <a:t>按一下以編輯母片標題樣式</a:t>
             </a:r>
-            <a:endParaRPr lang="zh-TW" altLang="en-US"/>
           </a:p>
         </p:txBody>
       </p:sp>
@@ -216,10 +221,9 @@
           </a:lstStyle>
           <a:p>
             <a:r>
-              <a:rPr lang="zh-TW" altLang="en-US" smtClean="0"/>
+              <a:rPr lang="zh-TW" altLang="en-US"/>
               <a:t>按一下以編輯母片副標題樣式</a:t>
             </a:r>
-            <a:endParaRPr lang="zh-TW" altLang="en-US"/>
           </a:p>
         </p:txBody>
       </p:sp>
@@ -334,10 +338,9 @@
           <a:lstStyle/>
           <a:p>
             <a:r>
-              <a:rPr lang="zh-TW" altLang="en-US" smtClean="0"/>
+              <a:rPr lang="zh-TW" altLang="en-US"/>
               <a:t>按一下以編輯母片標題樣式</a:t>
             </a:r>
-            <a:endParaRPr lang="zh-TW" altLang="en-US"/>
           </a:p>
         </p:txBody>
       </p:sp>
@@ -358,38 +361,37 @@
           <a:p>
             <a:pPr lvl="0"/>
             <a:r>
-              <a:rPr lang="zh-TW" altLang="en-US" smtClean="0"/>
+              <a:rPr lang="zh-TW" altLang="en-US"/>
               <a:t>編輯母片文字樣式</a:t>
             </a:r>
           </a:p>
           <a:p>
             <a:pPr lvl="1"/>
             <a:r>
-              <a:rPr lang="zh-TW" altLang="en-US" smtClean="0"/>
+              <a:rPr lang="zh-TW" altLang="en-US"/>
               <a:t>第二層</a:t>
             </a:r>
           </a:p>
           <a:p>
             <a:pPr lvl="2"/>
             <a:r>
-              <a:rPr lang="zh-TW" altLang="en-US" smtClean="0"/>
+              <a:rPr lang="zh-TW" altLang="en-US"/>
               <a:t>第三層</a:t>
             </a:r>
           </a:p>
           <a:p>
             <a:pPr lvl="3"/>
             <a:r>
-              <a:rPr lang="zh-TW" altLang="en-US" smtClean="0"/>
+              <a:rPr lang="zh-TW" altLang="en-US"/>
               <a:t>第四層</a:t>
             </a:r>
           </a:p>
           <a:p>
             <a:pPr lvl="4"/>
             <a:r>
-              <a:rPr lang="zh-TW" altLang="en-US" smtClean="0"/>
+              <a:rPr lang="zh-TW" altLang="en-US"/>
               <a:t>第五層</a:t>
             </a:r>
-            <a:endParaRPr lang="zh-TW" altLang="en-US"/>
           </a:p>
         </p:txBody>
       </p:sp>
@@ -509,10 +511,9 @@
           <a:lstStyle/>
           <a:p>
             <a:r>
-              <a:rPr lang="zh-TW" altLang="en-US" smtClean="0"/>
+              <a:rPr lang="zh-TW" altLang="en-US"/>
               <a:t>按一下以編輯母片標題樣式</a:t>
             </a:r>
-            <a:endParaRPr lang="zh-TW" altLang="en-US"/>
           </a:p>
         </p:txBody>
       </p:sp>
@@ -538,38 +539,37 @@
           <a:p>
             <a:pPr lvl="0"/>
             <a:r>
-              <a:rPr lang="zh-TW" altLang="en-US" smtClean="0"/>
+              <a:rPr lang="zh-TW" altLang="en-US"/>
               <a:t>編輯母片文字樣式</a:t>
             </a:r>
           </a:p>
           <a:p>
             <a:pPr lvl="1"/>
             <a:r>
-              <a:rPr lang="zh-TW" altLang="en-US" smtClean="0"/>
+              <a:rPr lang="zh-TW" altLang="en-US"/>
               <a:t>第二層</a:t>
             </a:r>
           </a:p>
           <a:p>
             <a:pPr lvl="2"/>
             <a:r>
-              <a:rPr lang="zh-TW" altLang="en-US" smtClean="0"/>
+              <a:rPr lang="zh-TW" altLang="en-US"/>
               <a:t>第三層</a:t>
             </a:r>
           </a:p>
           <a:p>
             <a:pPr lvl="3"/>
             <a:r>
-              <a:rPr lang="zh-TW" altLang="en-US" smtClean="0"/>
+              <a:rPr lang="zh-TW" altLang="en-US"/>
               <a:t>第四層</a:t>
             </a:r>
           </a:p>
           <a:p>
             <a:pPr lvl="4"/>
             <a:r>
-              <a:rPr lang="zh-TW" altLang="en-US" smtClean="0"/>
+              <a:rPr lang="zh-TW" altLang="en-US"/>
               <a:t>第五層</a:t>
             </a:r>
-            <a:endParaRPr lang="zh-TW" altLang="en-US"/>
           </a:p>
         </p:txBody>
       </p:sp>
@@ -684,10 +684,9 @@
           <a:lstStyle/>
           <a:p>
             <a:r>
-              <a:rPr lang="zh-TW" altLang="en-US" smtClean="0"/>
+              <a:rPr lang="zh-TW" altLang="en-US"/>
               <a:t>按一下以編輯母片標題樣式</a:t>
             </a:r>
-            <a:endParaRPr lang="zh-TW" altLang="en-US"/>
           </a:p>
         </p:txBody>
       </p:sp>
@@ -708,38 +707,37 @@
           <a:p>
             <a:pPr lvl="0"/>
             <a:r>
-              <a:rPr lang="zh-TW" altLang="en-US" smtClean="0"/>
+              <a:rPr lang="zh-TW" altLang="en-US"/>
               <a:t>編輯母片文字樣式</a:t>
             </a:r>
           </a:p>
           <a:p>
             <a:pPr lvl="1"/>
             <a:r>
-              <a:rPr lang="zh-TW" altLang="en-US" smtClean="0"/>
+              <a:rPr lang="zh-TW" altLang="en-US"/>
               <a:t>第二層</a:t>
             </a:r>
           </a:p>
           <a:p>
             <a:pPr lvl="2"/>
             <a:r>
-              <a:rPr lang="zh-TW" altLang="en-US" smtClean="0"/>
+              <a:rPr lang="zh-TW" altLang="en-US"/>
               <a:t>第三層</a:t>
             </a:r>
           </a:p>
           <a:p>
             <a:pPr lvl="3"/>
             <a:r>
-              <a:rPr lang="zh-TW" altLang="en-US" smtClean="0"/>
+              <a:rPr lang="zh-TW" altLang="en-US"/>
               <a:t>第四層</a:t>
             </a:r>
           </a:p>
           <a:p>
             <a:pPr lvl="4"/>
             <a:r>
-              <a:rPr lang="zh-TW" altLang="en-US" smtClean="0"/>
+              <a:rPr lang="zh-TW" altLang="en-US"/>
               <a:t>第五層</a:t>
             </a:r>
-            <a:endParaRPr lang="zh-TW" altLang="en-US"/>
           </a:p>
         </p:txBody>
       </p:sp>
@@ -863,10 +861,9 @@
           </a:lstStyle>
           <a:p>
             <a:r>
-              <a:rPr lang="zh-TW" altLang="en-US" smtClean="0"/>
+              <a:rPr lang="zh-TW" altLang="en-US"/>
               <a:t>按一下以編輯母片標題樣式</a:t>
             </a:r>
-            <a:endParaRPr lang="zh-TW" altLang="en-US"/>
           </a:p>
         </p:txBody>
       </p:sp>
@@ -983,7 +980,7 @@
           <a:p>
             <a:pPr lvl="0"/>
             <a:r>
-              <a:rPr lang="zh-TW" altLang="en-US" smtClean="0"/>
+              <a:rPr lang="zh-TW" altLang="en-US"/>
               <a:t>編輯母片文字樣式</a:t>
             </a:r>
           </a:p>
@@ -1100,10 +1097,9 @@
           <a:lstStyle/>
           <a:p>
             <a:r>
-              <a:rPr lang="zh-TW" altLang="en-US" smtClean="0"/>
+              <a:rPr lang="zh-TW" altLang="en-US"/>
               <a:t>按一下以編輯母片標題樣式</a:t>
             </a:r>
-            <a:endParaRPr lang="zh-TW" altLang="en-US"/>
           </a:p>
         </p:txBody>
       </p:sp>
@@ -1129,38 +1125,37 @@
           <a:p>
             <a:pPr lvl="0"/>
             <a:r>
-              <a:rPr lang="zh-TW" altLang="en-US" smtClean="0"/>
+              <a:rPr lang="zh-TW" altLang="en-US"/>
               <a:t>編輯母片文字樣式</a:t>
             </a:r>
           </a:p>
           <a:p>
             <a:pPr lvl="1"/>
             <a:r>
-              <a:rPr lang="zh-TW" altLang="en-US" smtClean="0"/>
+              <a:rPr lang="zh-TW" altLang="en-US"/>
               <a:t>第二層</a:t>
             </a:r>
           </a:p>
           <a:p>
             <a:pPr lvl="2"/>
             <a:r>
-              <a:rPr lang="zh-TW" altLang="en-US" smtClean="0"/>
+              <a:rPr lang="zh-TW" altLang="en-US"/>
               <a:t>第三層</a:t>
             </a:r>
           </a:p>
           <a:p>
             <a:pPr lvl="3"/>
             <a:r>
-              <a:rPr lang="zh-TW" altLang="en-US" smtClean="0"/>
+              <a:rPr lang="zh-TW" altLang="en-US"/>
               <a:t>第四層</a:t>
             </a:r>
           </a:p>
           <a:p>
             <a:pPr lvl="4"/>
             <a:r>
-              <a:rPr lang="zh-TW" altLang="en-US" smtClean="0"/>
+              <a:rPr lang="zh-TW" altLang="en-US"/>
               <a:t>第五層</a:t>
             </a:r>
-            <a:endParaRPr lang="zh-TW" altLang="en-US"/>
           </a:p>
         </p:txBody>
       </p:sp>
@@ -1186,38 +1181,37 @@
           <a:p>
             <a:pPr lvl="0"/>
             <a:r>
-              <a:rPr lang="zh-TW" altLang="en-US" smtClean="0"/>
+              <a:rPr lang="zh-TW" altLang="en-US"/>
               <a:t>編輯母片文字樣式</a:t>
             </a:r>
           </a:p>
           <a:p>
             <a:pPr lvl="1"/>
             <a:r>
-              <a:rPr lang="zh-TW" altLang="en-US" smtClean="0"/>
+              <a:rPr lang="zh-TW" altLang="en-US"/>
               <a:t>第二層</a:t>
             </a:r>
           </a:p>
           <a:p>
             <a:pPr lvl="2"/>
             <a:r>
-              <a:rPr lang="zh-TW" altLang="en-US" smtClean="0"/>
+              <a:rPr lang="zh-TW" altLang="en-US"/>
               <a:t>第三層</a:t>
             </a:r>
           </a:p>
           <a:p>
             <a:pPr lvl="3"/>
             <a:r>
-              <a:rPr lang="zh-TW" altLang="en-US" smtClean="0"/>
+              <a:rPr lang="zh-TW" altLang="en-US"/>
               <a:t>第四層</a:t>
             </a:r>
           </a:p>
           <a:p>
             <a:pPr lvl="4"/>
             <a:r>
-              <a:rPr lang="zh-TW" altLang="en-US" smtClean="0"/>
+              <a:rPr lang="zh-TW" altLang="en-US"/>
               <a:t>第五層</a:t>
             </a:r>
-            <a:endParaRPr lang="zh-TW" altLang="en-US"/>
           </a:p>
         </p:txBody>
       </p:sp>
@@ -1337,10 +1331,9 @@
           <a:lstStyle/>
           <a:p>
             <a:r>
-              <a:rPr lang="zh-TW" altLang="en-US" smtClean="0"/>
+              <a:rPr lang="zh-TW" altLang="en-US"/>
               <a:t>按一下以編輯母片標題樣式</a:t>
             </a:r>
-            <a:endParaRPr lang="zh-TW" altLang="en-US"/>
           </a:p>
         </p:txBody>
       </p:sp>
@@ -1403,7 +1396,7 @@
           <a:p>
             <a:pPr lvl="0"/>
             <a:r>
-              <a:rPr lang="zh-TW" altLang="en-US" smtClean="0"/>
+              <a:rPr lang="zh-TW" altLang="en-US"/>
               <a:t>編輯母片文字樣式</a:t>
             </a:r>
           </a:p>
@@ -1431,38 +1424,37 @@
           <a:p>
             <a:pPr lvl="0"/>
             <a:r>
-              <a:rPr lang="zh-TW" altLang="en-US" smtClean="0"/>
+              <a:rPr lang="zh-TW" altLang="en-US"/>
               <a:t>編輯母片文字樣式</a:t>
             </a:r>
           </a:p>
           <a:p>
             <a:pPr lvl="1"/>
             <a:r>
-              <a:rPr lang="zh-TW" altLang="en-US" smtClean="0"/>
+              <a:rPr lang="zh-TW" altLang="en-US"/>
               <a:t>第二層</a:t>
             </a:r>
           </a:p>
           <a:p>
             <a:pPr lvl="2"/>
             <a:r>
-              <a:rPr lang="zh-TW" altLang="en-US" smtClean="0"/>
+              <a:rPr lang="zh-TW" altLang="en-US"/>
               <a:t>第三層</a:t>
             </a:r>
           </a:p>
           <a:p>
             <a:pPr lvl="3"/>
             <a:r>
-              <a:rPr lang="zh-TW" altLang="en-US" smtClean="0"/>
+              <a:rPr lang="zh-TW" altLang="en-US"/>
               <a:t>第四層</a:t>
             </a:r>
           </a:p>
           <a:p>
             <a:pPr lvl="4"/>
             <a:r>
-              <a:rPr lang="zh-TW" altLang="en-US" smtClean="0"/>
+              <a:rPr lang="zh-TW" altLang="en-US"/>
               <a:t>第五層</a:t>
             </a:r>
-            <a:endParaRPr lang="zh-TW" altLang="en-US"/>
           </a:p>
         </p:txBody>
       </p:sp>
@@ -1525,7 +1517,7 @@
           <a:p>
             <a:pPr lvl="0"/>
             <a:r>
-              <a:rPr lang="zh-TW" altLang="en-US" smtClean="0"/>
+              <a:rPr lang="zh-TW" altLang="en-US"/>
               <a:t>編輯母片文字樣式</a:t>
             </a:r>
           </a:p>
@@ -1553,38 +1545,37 @@
           <a:p>
             <a:pPr lvl="0"/>
             <a:r>
-              <a:rPr lang="zh-TW" altLang="en-US" smtClean="0"/>
+              <a:rPr lang="zh-TW" altLang="en-US"/>
               <a:t>編輯母片文字樣式</a:t>
             </a:r>
           </a:p>
           <a:p>
             <a:pPr lvl="1"/>
             <a:r>
-              <a:rPr lang="zh-TW" altLang="en-US" smtClean="0"/>
+              <a:rPr lang="zh-TW" altLang="en-US"/>
               <a:t>第二層</a:t>
             </a:r>
           </a:p>
           <a:p>
             <a:pPr lvl="2"/>
             <a:r>
-              <a:rPr lang="zh-TW" altLang="en-US" smtClean="0"/>
+              <a:rPr lang="zh-TW" altLang="en-US"/>
               <a:t>第三層</a:t>
             </a:r>
           </a:p>
           <a:p>
             <a:pPr lvl="3"/>
             <a:r>
-              <a:rPr lang="zh-TW" altLang="en-US" smtClean="0"/>
+              <a:rPr lang="zh-TW" altLang="en-US"/>
               <a:t>第四層</a:t>
             </a:r>
           </a:p>
           <a:p>
             <a:pPr lvl="4"/>
             <a:r>
-              <a:rPr lang="zh-TW" altLang="en-US" smtClean="0"/>
+              <a:rPr lang="zh-TW" altLang="en-US"/>
               <a:t>第五層</a:t>
             </a:r>
-            <a:endParaRPr lang="zh-TW" altLang="en-US"/>
           </a:p>
         </p:txBody>
       </p:sp>
@@ -1699,10 +1690,9 @@
           <a:lstStyle/>
           <a:p>
             <a:r>
-              <a:rPr lang="zh-TW" altLang="en-US" smtClean="0"/>
+              <a:rPr lang="zh-TW" altLang="en-US"/>
               <a:t>按一下以編輯母片標題樣式</a:t>
             </a:r>
-            <a:endParaRPr lang="zh-TW" altLang="en-US"/>
           </a:p>
         </p:txBody>
       </p:sp>
@@ -1921,10 +1911,9 @@
           </a:lstStyle>
           <a:p>
             <a:r>
-              <a:rPr lang="zh-TW" altLang="en-US" smtClean="0"/>
+              <a:rPr lang="zh-TW" altLang="en-US"/>
               <a:t>按一下以編輯母片標題樣式</a:t>
             </a:r>
-            <a:endParaRPr lang="zh-TW" altLang="en-US"/>
           </a:p>
         </p:txBody>
       </p:sp>
@@ -1978,38 +1967,37 @@
           <a:p>
             <a:pPr lvl="0"/>
             <a:r>
-              <a:rPr lang="zh-TW" altLang="en-US" smtClean="0"/>
+              <a:rPr lang="zh-TW" altLang="en-US"/>
               <a:t>編輯母片文字樣式</a:t>
             </a:r>
           </a:p>
           <a:p>
             <a:pPr lvl="1"/>
             <a:r>
-              <a:rPr lang="zh-TW" altLang="en-US" smtClean="0"/>
+              <a:rPr lang="zh-TW" altLang="en-US"/>
               <a:t>第二層</a:t>
             </a:r>
           </a:p>
           <a:p>
             <a:pPr lvl="2"/>
             <a:r>
-              <a:rPr lang="zh-TW" altLang="en-US" smtClean="0"/>
+              <a:rPr lang="zh-TW" altLang="en-US"/>
               <a:t>第三層</a:t>
             </a:r>
           </a:p>
           <a:p>
             <a:pPr lvl="3"/>
             <a:r>
-              <a:rPr lang="zh-TW" altLang="en-US" smtClean="0"/>
+              <a:rPr lang="zh-TW" altLang="en-US"/>
               <a:t>第四層</a:t>
             </a:r>
           </a:p>
           <a:p>
             <a:pPr lvl="4"/>
             <a:r>
-              <a:rPr lang="zh-TW" altLang="en-US" smtClean="0"/>
+              <a:rPr lang="zh-TW" altLang="en-US"/>
               <a:t>第五層</a:t>
             </a:r>
-            <a:endParaRPr lang="zh-TW" altLang="en-US"/>
           </a:p>
         </p:txBody>
       </p:sp>
@@ -2072,7 +2060,7 @@
           <a:p>
             <a:pPr lvl="0"/>
             <a:r>
-              <a:rPr lang="zh-TW" altLang="en-US" smtClean="0"/>
+              <a:rPr lang="zh-TW" altLang="en-US"/>
               <a:t>編輯母片文字樣式</a:t>
             </a:r>
           </a:p>
@@ -2198,10 +2186,9 @@
           </a:lstStyle>
           <a:p>
             <a:r>
-              <a:rPr lang="zh-TW" altLang="en-US" smtClean="0"/>
+              <a:rPr lang="zh-TW" altLang="en-US"/>
               <a:t>按一下以編輯母片標題樣式</a:t>
             </a:r>
-            <a:endParaRPr lang="zh-TW" altLang="en-US"/>
           </a:p>
         </p:txBody>
       </p:sp>
@@ -2263,10 +2250,9 @@
           </a:lstStyle>
           <a:p>
             <a:r>
-              <a:rPr lang="zh-TW" altLang="en-US" smtClean="0"/>
+              <a:rPr lang="zh-TW" altLang="en-US"/>
               <a:t>按一下圖示以新增圖片</a:t>
             </a:r>
-            <a:endParaRPr lang="zh-TW" altLang="en-US"/>
           </a:p>
         </p:txBody>
       </p:sp>
@@ -2329,7 +2315,7 @@
           <a:p>
             <a:pPr lvl="0"/>
             <a:r>
-              <a:rPr lang="zh-TW" altLang="en-US" smtClean="0"/>
+              <a:rPr lang="zh-TW" altLang="en-US"/>
               <a:t>編輯母片文字樣式</a:t>
             </a:r>
           </a:p>
@@ -2461,10 +2447,9 @@
           <a:lstStyle/>
           <a:p>
             <a:r>
-              <a:rPr lang="zh-TW" altLang="en-US" smtClean="0"/>
+              <a:rPr lang="zh-TW" altLang="en-US"/>
               <a:t>按一下以編輯母片標題樣式</a:t>
             </a:r>
-            <a:endParaRPr lang="zh-TW" altLang="en-US"/>
           </a:p>
         </p:txBody>
       </p:sp>
@@ -2495,38 +2480,37 @@
           <a:p>
             <a:pPr lvl="0"/>
             <a:r>
-              <a:rPr lang="zh-TW" altLang="en-US" smtClean="0"/>
+              <a:rPr lang="zh-TW" altLang="en-US"/>
               <a:t>編輯母片文字樣式</a:t>
             </a:r>
           </a:p>
           <a:p>
             <a:pPr lvl="1"/>
             <a:r>
-              <a:rPr lang="zh-TW" altLang="en-US" smtClean="0"/>
+              <a:rPr lang="zh-TW" altLang="en-US"/>
               <a:t>第二層</a:t>
             </a:r>
           </a:p>
           <a:p>
             <a:pPr lvl="2"/>
             <a:r>
-              <a:rPr lang="zh-TW" altLang="en-US" smtClean="0"/>
+              <a:rPr lang="zh-TW" altLang="en-US"/>
               <a:t>第三層</a:t>
             </a:r>
           </a:p>
           <a:p>
             <a:pPr lvl="3"/>
             <a:r>
-              <a:rPr lang="zh-TW" altLang="en-US" smtClean="0"/>
+              <a:rPr lang="zh-TW" altLang="en-US"/>
               <a:t>第四層</a:t>
             </a:r>
           </a:p>
           <a:p>
             <a:pPr lvl="4"/>
             <a:r>
-              <a:rPr lang="zh-TW" altLang="en-US" smtClean="0"/>
+              <a:rPr lang="zh-TW" altLang="en-US"/>
               <a:t>第五層</a:t>
             </a:r>
-            <a:endParaRPr lang="zh-TW" altLang="en-US"/>
           </a:p>
         </p:txBody>
       </p:sp>
@@ -2986,7 +2970,7 @@
           <a:lstStyle/>
           <a:p>
             <a:r>
-              <a:rPr lang="en-US" altLang="zh-TW" dirty="0" smtClean="0"/>
+              <a:rPr lang="en-US" altLang="zh-TW" dirty="0"/>
               <a:t>Side Project</a:t>
             </a:r>
             <a:endParaRPr lang="zh-TW" altLang="en-US" dirty="0"/>
@@ -3058,8 +3042,8 @@
           <a:lstStyle/>
           <a:p>
             <a:r>
-              <a:rPr lang="en-US" altLang="zh-TW" dirty="0" smtClean="0"/>
-              <a:t>Commits 1</a:t>
+              <a:rPr lang="en-US" altLang="zh-TW" dirty="0"/>
+              <a:t>V1</a:t>
             </a:r>
             <a:endParaRPr lang="zh-TW" altLang="en-US" dirty="0"/>
           </a:p>
@@ -3161,6 +3145,95 @@
 </file>
 
 <file path=ppt/slides/slide3.xml><?xml version="1.0" encoding="utf-8"?>
+<p:sld xmlns:a="http://schemas.openxmlformats.org/drawingml/2006/main" xmlns:r="http://schemas.openxmlformats.org/officeDocument/2006/relationships" xmlns:p="http://schemas.openxmlformats.org/presentationml/2006/main">
+  <p:cSld>
+    <p:spTree>
+      <p:nvGrpSpPr>
+        <p:cNvPr id="1" name=""/>
+        <p:cNvGrpSpPr/>
+        <p:nvPr/>
+      </p:nvGrpSpPr>
+      <p:grpSpPr>
+        <a:xfrm>
+          <a:off x="0" y="0"/>
+          <a:ext cx="0" cy="0"/>
+          <a:chOff x="0" y="0"/>
+          <a:chExt cx="0" cy="0"/>
+        </a:xfrm>
+      </p:grpSpPr>
+      <p:sp>
+        <p:nvSpPr>
+          <p:cNvPr id="2" name="標題 1">
+            <a:extLst>
+              <a:ext uri="{FF2B5EF4-FFF2-40B4-BE49-F238E27FC236}">
+                <a16:creationId xmlns:a16="http://schemas.microsoft.com/office/drawing/2014/main" id="{69EEEDCE-EF3F-4A23-9941-59E0FA5DF8D4}"/>
+              </a:ext>
+            </a:extLst>
+          </p:cNvPr>
+          <p:cNvSpPr>
+            <a:spLocks noGrp="1"/>
+          </p:cNvSpPr>
+          <p:nvPr>
+            <p:ph type="title"/>
+          </p:nvPr>
+        </p:nvSpPr>
+        <p:spPr/>
+        <p:txBody>
+          <a:bodyPr/>
+          <a:lstStyle/>
+          <a:p>
+            <a:r>
+              <a:rPr lang="en-US" altLang="zh-TW" dirty="0"/>
+              <a:t>V2</a:t>
+            </a:r>
+            <a:endParaRPr lang="zh-TW" altLang="en-US" dirty="0"/>
+          </a:p>
+        </p:txBody>
+      </p:sp>
+      <p:pic>
+        <p:nvPicPr>
+          <p:cNvPr id="4" name="圖片 3">
+            <a:extLst>
+              <a:ext uri="{FF2B5EF4-FFF2-40B4-BE49-F238E27FC236}">
+                <a16:creationId xmlns:a16="http://schemas.microsoft.com/office/drawing/2014/main" id="{72DDEEAB-1EB6-49FB-B062-C9790354FDDF}"/>
+              </a:ext>
+            </a:extLst>
+          </p:cNvPr>
+          <p:cNvPicPr>
+            <a:picLocks noChangeAspect="1"/>
+          </p:cNvPicPr>
+          <p:nvPr/>
+        </p:nvPicPr>
+        <p:blipFill>
+          <a:blip r:embed="rId2"/>
+          <a:stretch>
+            <a:fillRect/>
+          </a:stretch>
+        </p:blipFill>
+        <p:spPr>
+          <a:xfrm>
+            <a:off x="2109396" y="1593826"/>
+            <a:ext cx="4979662" cy="4811808"/>
+          </a:xfrm>
+          <a:prstGeom prst="rect">
+            <a:avLst/>
+          </a:prstGeom>
+        </p:spPr>
+      </p:pic>
+    </p:spTree>
+    <p:extLst>
+      <p:ext uri="{BB962C8B-B14F-4D97-AF65-F5344CB8AC3E}">
+        <p14:creationId xmlns:p14="http://schemas.microsoft.com/office/powerpoint/2010/main" val="799159484"/>
+      </p:ext>
+    </p:extLst>
+  </p:cSld>
+  <p:clrMapOvr>
+    <a:masterClrMapping/>
+  </p:clrMapOvr>
+</p:sld>
+</file>
+
+<file path=ppt/slides/slide4.xml><?xml version="1.0" encoding="utf-8"?>
 <p:sld xmlns:a="http://schemas.openxmlformats.org/drawingml/2006/main" xmlns:r="http://schemas.openxmlformats.org/officeDocument/2006/relationships" xmlns:p="http://schemas.openxmlformats.org/presentationml/2006/main">
   <p:cSld>
     <p:spTree>

</xml_diff>

<commit_message>
add timestamp & loading content
</commit_message>
<xml_diff>
--- a/Side Project.pptx
+++ b/Side Project.pptx
@@ -244,7 +244,7 @@
           <a:p>
             <a:fld id="{F79B78E4-BB71-41E9-9D7A-CC5FB42094C8}" type="datetimeFigureOut">
               <a:rPr lang="zh-TW" altLang="en-US" smtClean="0"/>
-              <a:t>2025/5/3</a:t>
+              <a:t>2025/5/4</a:t>
             </a:fld>
             <a:endParaRPr lang="zh-TW" altLang="en-US"/>
           </a:p>
@@ -412,7 +412,7 @@
           <a:p>
             <a:fld id="{F79B78E4-BB71-41E9-9D7A-CC5FB42094C8}" type="datetimeFigureOut">
               <a:rPr lang="zh-TW" altLang="en-US" smtClean="0"/>
-              <a:t>2025/5/3</a:t>
+              <a:t>2025/5/4</a:t>
             </a:fld>
             <a:endParaRPr lang="zh-TW" altLang="en-US"/>
           </a:p>
@@ -590,7 +590,7 @@
           <a:p>
             <a:fld id="{F79B78E4-BB71-41E9-9D7A-CC5FB42094C8}" type="datetimeFigureOut">
               <a:rPr lang="zh-TW" altLang="en-US" smtClean="0"/>
-              <a:t>2025/5/3</a:t>
+              <a:t>2025/5/4</a:t>
             </a:fld>
             <a:endParaRPr lang="zh-TW" altLang="en-US"/>
           </a:p>
@@ -758,7 +758,7 @@
           <a:p>
             <a:fld id="{F79B78E4-BB71-41E9-9D7A-CC5FB42094C8}" type="datetimeFigureOut">
               <a:rPr lang="zh-TW" altLang="en-US" smtClean="0"/>
-              <a:t>2025/5/3</a:t>
+              <a:t>2025/5/4</a:t>
             </a:fld>
             <a:endParaRPr lang="zh-TW" altLang="en-US"/>
           </a:p>
@@ -1003,7 +1003,7 @@
           <a:p>
             <a:fld id="{F79B78E4-BB71-41E9-9D7A-CC5FB42094C8}" type="datetimeFigureOut">
               <a:rPr lang="zh-TW" altLang="en-US" smtClean="0"/>
-              <a:t>2025/5/3</a:t>
+              <a:t>2025/5/4</a:t>
             </a:fld>
             <a:endParaRPr lang="zh-TW" altLang="en-US"/>
           </a:p>
@@ -1232,7 +1232,7 @@
           <a:p>
             <a:fld id="{F79B78E4-BB71-41E9-9D7A-CC5FB42094C8}" type="datetimeFigureOut">
               <a:rPr lang="zh-TW" altLang="en-US" smtClean="0"/>
-              <a:t>2025/5/3</a:t>
+              <a:t>2025/5/4</a:t>
             </a:fld>
             <a:endParaRPr lang="zh-TW" altLang="en-US"/>
           </a:p>
@@ -1596,7 +1596,7 @@
           <a:p>
             <a:fld id="{F79B78E4-BB71-41E9-9D7A-CC5FB42094C8}" type="datetimeFigureOut">
               <a:rPr lang="zh-TW" altLang="en-US" smtClean="0"/>
-              <a:t>2025/5/3</a:t>
+              <a:t>2025/5/4</a:t>
             </a:fld>
             <a:endParaRPr lang="zh-TW" altLang="en-US"/>
           </a:p>
@@ -1713,7 +1713,7 @@
           <a:p>
             <a:fld id="{F79B78E4-BB71-41E9-9D7A-CC5FB42094C8}" type="datetimeFigureOut">
               <a:rPr lang="zh-TW" altLang="en-US" smtClean="0"/>
-              <a:t>2025/5/3</a:t>
+              <a:t>2025/5/4</a:t>
             </a:fld>
             <a:endParaRPr lang="zh-TW" altLang="en-US"/>
           </a:p>
@@ -1808,7 +1808,7 @@
           <a:p>
             <a:fld id="{F79B78E4-BB71-41E9-9D7A-CC5FB42094C8}" type="datetimeFigureOut">
               <a:rPr lang="zh-TW" altLang="en-US" smtClean="0"/>
-              <a:t>2025/5/3</a:t>
+              <a:t>2025/5/4</a:t>
             </a:fld>
             <a:endParaRPr lang="zh-TW" altLang="en-US"/>
           </a:p>
@@ -2083,7 +2083,7 @@
           <a:p>
             <a:fld id="{F79B78E4-BB71-41E9-9D7A-CC5FB42094C8}" type="datetimeFigureOut">
               <a:rPr lang="zh-TW" altLang="en-US" smtClean="0"/>
-              <a:t>2025/5/3</a:t>
+              <a:t>2025/5/4</a:t>
             </a:fld>
             <a:endParaRPr lang="zh-TW" altLang="en-US"/>
           </a:p>
@@ -2338,7 +2338,7 @@
           <a:p>
             <a:fld id="{F79B78E4-BB71-41E9-9D7A-CC5FB42094C8}" type="datetimeFigureOut">
               <a:rPr lang="zh-TW" altLang="en-US" smtClean="0"/>
-              <a:t>2025/5/3</a:t>
+              <a:t>2025/5/4</a:t>
             </a:fld>
             <a:endParaRPr lang="zh-TW" altLang="en-US"/>
           </a:p>
@@ -2549,7 +2549,7 @@
           <a:p>
             <a:fld id="{F79B78E4-BB71-41E9-9D7A-CC5FB42094C8}" type="datetimeFigureOut">
               <a:rPr lang="zh-TW" altLang="en-US" smtClean="0"/>
-              <a:t>2025/5/3</a:t>
+              <a:t>2025/5/4</a:t>
             </a:fld>
             <a:endParaRPr lang="zh-TW" altLang="en-US"/>
           </a:p>
@@ -3250,6 +3250,126 @@
           <a:chExt cx="0" cy="0"/>
         </a:xfrm>
       </p:grpSpPr>
+      <p:pic>
+        <p:nvPicPr>
+          <p:cNvPr id="7" name="圖片 6">
+            <a:extLst>
+              <a:ext uri="{FF2B5EF4-FFF2-40B4-BE49-F238E27FC236}">
+                <a16:creationId xmlns:a16="http://schemas.microsoft.com/office/drawing/2014/main" id="{1EDE89F3-6BD3-44E5-B13E-94D2AAEDA0DB}"/>
+              </a:ext>
+            </a:extLst>
+          </p:cNvPr>
+          <p:cNvPicPr>
+            <a:picLocks noChangeAspect="1"/>
+          </p:cNvPicPr>
+          <p:nvPr/>
+        </p:nvPicPr>
+        <p:blipFill>
+          <a:blip r:embed="rId2"/>
+          <a:stretch>
+            <a:fillRect/>
+          </a:stretch>
+        </p:blipFill>
+        <p:spPr>
+          <a:xfrm>
+            <a:off x="275303" y="894735"/>
+            <a:ext cx="2702633" cy="4709652"/>
+          </a:xfrm>
+          <a:prstGeom prst="rect">
+            <a:avLst/>
+          </a:prstGeom>
+        </p:spPr>
+      </p:pic>
+      <p:pic>
+        <p:nvPicPr>
+          <p:cNvPr id="9" name="圖片 8">
+            <a:extLst>
+              <a:ext uri="{FF2B5EF4-FFF2-40B4-BE49-F238E27FC236}">
+                <a16:creationId xmlns:a16="http://schemas.microsoft.com/office/drawing/2014/main" id="{CA016C95-3A55-49A9-BAD3-E3D1F93C293D}"/>
+              </a:ext>
+            </a:extLst>
+          </p:cNvPr>
+          <p:cNvPicPr>
+            <a:picLocks noChangeAspect="1"/>
+          </p:cNvPicPr>
+          <p:nvPr/>
+        </p:nvPicPr>
+        <p:blipFill>
+          <a:blip r:embed="rId3"/>
+          <a:stretch>
+            <a:fillRect/>
+          </a:stretch>
+        </p:blipFill>
+        <p:spPr>
+          <a:xfrm>
+            <a:off x="3261333" y="894735"/>
+            <a:ext cx="2741795" cy="4798142"/>
+          </a:xfrm>
+          <a:prstGeom prst="rect">
+            <a:avLst/>
+          </a:prstGeom>
+        </p:spPr>
+      </p:pic>
+      <p:pic>
+        <p:nvPicPr>
+          <p:cNvPr id="11" name="圖片 10">
+            <a:extLst>
+              <a:ext uri="{FF2B5EF4-FFF2-40B4-BE49-F238E27FC236}">
+                <a16:creationId xmlns:a16="http://schemas.microsoft.com/office/drawing/2014/main" id="{0948C73F-7D55-4F58-B01A-A442FF56EC32}"/>
+              </a:ext>
+            </a:extLst>
+          </p:cNvPr>
+          <p:cNvPicPr>
+            <a:picLocks noChangeAspect="1"/>
+          </p:cNvPicPr>
+          <p:nvPr/>
+        </p:nvPicPr>
+        <p:blipFill>
+          <a:blip r:embed="rId4"/>
+          <a:stretch>
+            <a:fillRect/>
+          </a:stretch>
+        </p:blipFill>
+        <p:spPr>
+          <a:xfrm>
+            <a:off x="6121208" y="894735"/>
+            <a:ext cx="2809960" cy="4886632"/>
+          </a:xfrm>
+          <a:prstGeom prst="rect">
+            <a:avLst/>
+          </a:prstGeom>
+        </p:spPr>
+      </p:pic>
+      <p:pic>
+        <p:nvPicPr>
+          <p:cNvPr id="13" name="圖片 12">
+            <a:extLst>
+              <a:ext uri="{FF2B5EF4-FFF2-40B4-BE49-F238E27FC236}">
+                <a16:creationId xmlns:a16="http://schemas.microsoft.com/office/drawing/2014/main" id="{259FFDEF-1683-4D88-A458-EDD3DC999AED}"/>
+              </a:ext>
+            </a:extLst>
+          </p:cNvPr>
+          <p:cNvPicPr>
+            <a:picLocks noChangeAspect="1"/>
+          </p:cNvPicPr>
+          <p:nvPr/>
+        </p:nvPicPr>
+        <p:blipFill>
+          <a:blip r:embed="rId5"/>
+          <a:stretch>
+            <a:fillRect/>
+          </a:stretch>
+        </p:blipFill>
+        <p:spPr>
+          <a:xfrm>
+            <a:off x="9122931" y="894736"/>
+            <a:ext cx="2736846" cy="4798142"/>
+          </a:xfrm>
+          <a:prstGeom prst="rect">
+            <a:avLst/>
+          </a:prstGeom>
+        </p:spPr>
+      </p:pic>
     </p:spTree>
     <p:extLst>
       <p:ext uri="{BB962C8B-B14F-4D97-AF65-F5344CB8AC3E}">

</xml_diff>

<commit_message>
Pull the progress bar to the bottom
</commit_message>
<xml_diff>
--- a/Side Project.pptx
+++ b/Side Project.pptx
@@ -9,6 +9,7 @@
     <p:sldId id="258" r:id="rId3"/>
     <p:sldId id="259" r:id="rId4"/>
     <p:sldId id="257" r:id="rId5"/>
+    <p:sldId id="260" r:id="rId6"/>
   </p:sldIdLst>
   <p:sldSz cx="12192000" cy="6858000"/>
   <p:notesSz cx="6858000" cy="9144000"/>
@@ -3383,6 +3384,96 @@
 </p:sld>
 </file>
 
+<file path=ppt/slides/slide5.xml><?xml version="1.0" encoding="utf-8"?>
+<p:sld xmlns:a="http://schemas.openxmlformats.org/drawingml/2006/main" xmlns:r="http://schemas.openxmlformats.org/officeDocument/2006/relationships" xmlns:p="http://schemas.openxmlformats.org/presentationml/2006/main">
+  <p:cSld>
+    <p:spTree>
+      <p:nvGrpSpPr>
+        <p:cNvPr id="1" name=""/>
+        <p:cNvGrpSpPr/>
+        <p:nvPr/>
+      </p:nvGrpSpPr>
+      <p:grpSpPr>
+        <a:xfrm>
+          <a:off x="0" y="0"/>
+          <a:ext cx="0" cy="0"/>
+          <a:chOff x="0" y="0"/>
+          <a:chExt cx="0" cy="0"/>
+        </a:xfrm>
+      </p:grpSpPr>
+      <p:pic>
+        <p:nvPicPr>
+          <p:cNvPr id="5" name="圖片 4">
+            <a:extLst>
+              <a:ext uri="{FF2B5EF4-FFF2-40B4-BE49-F238E27FC236}">
+                <a16:creationId xmlns:a16="http://schemas.microsoft.com/office/drawing/2014/main" id="{AD2F9D08-A9D3-441F-A78D-422AE59DF0D4}"/>
+              </a:ext>
+            </a:extLst>
+          </p:cNvPr>
+          <p:cNvPicPr>
+            <a:picLocks noChangeAspect="1"/>
+          </p:cNvPicPr>
+          <p:nvPr/>
+        </p:nvPicPr>
+        <p:blipFill>
+          <a:blip r:embed="rId2"/>
+          <a:stretch>
+            <a:fillRect/>
+          </a:stretch>
+        </p:blipFill>
+        <p:spPr>
+          <a:xfrm>
+            <a:off x="2091840" y="619432"/>
+            <a:ext cx="3226427" cy="5619135"/>
+          </a:xfrm>
+          <a:prstGeom prst="rect">
+            <a:avLst/>
+          </a:prstGeom>
+        </p:spPr>
+      </p:pic>
+      <p:pic>
+        <p:nvPicPr>
+          <p:cNvPr id="7" name="圖片 6">
+            <a:extLst>
+              <a:ext uri="{FF2B5EF4-FFF2-40B4-BE49-F238E27FC236}">
+                <a16:creationId xmlns:a16="http://schemas.microsoft.com/office/drawing/2014/main" id="{1AD46223-EDDA-4F6D-B9EF-AF1745E6B7E4}"/>
+              </a:ext>
+            </a:extLst>
+          </p:cNvPr>
+          <p:cNvPicPr>
+            <a:picLocks noChangeAspect="1"/>
+          </p:cNvPicPr>
+          <p:nvPr/>
+        </p:nvPicPr>
+        <p:blipFill>
+          <a:blip r:embed="rId3"/>
+          <a:stretch>
+            <a:fillRect/>
+          </a:stretch>
+        </p:blipFill>
+        <p:spPr>
+          <a:xfrm>
+            <a:off x="5810864" y="619432"/>
+            <a:ext cx="3222443" cy="5619135"/>
+          </a:xfrm>
+          <a:prstGeom prst="rect">
+            <a:avLst/>
+          </a:prstGeom>
+        </p:spPr>
+      </p:pic>
+    </p:spTree>
+    <p:extLst>
+      <p:ext uri="{BB962C8B-B14F-4D97-AF65-F5344CB8AC3E}">
+        <p14:creationId xmlns:p14="http://schemas.microsoft.com/office/powerpoint/2010/main" val="3015647804"/>
+      </p:ext>
+    </p:extLst>
+  </p:cSld>
+  <p:clrMapOvr>
+    <a:masterClrMapping/>
+  </p:clrMapOvr>
+</p:sld>
+</file>
+
 <file path=ppt/theme/theme1.xml><?xml version="1.0" encoding="utf-8"?>
 <a:theme xmlns:a="http://schemas.openxmlformats.org/drawingml/2006/main" name="Office 佈景主題">
   <a:themeElements>

</xml_diff>